<commit_message>
Update assignment for liss dataset
</commit_message>
<xml_diff>
--- a/files/apply-skills-to-liss-dataset-exercise.pptx
+++ b/files/apply-skills-to-liss-dataset-exercise.pptx
@@ -142,9 +142,103 @@
 <file path=ppt/revisionInfo.xml><?xml version="1.0" encoding="utf-8"?>
 <p1510:revInfo xmlns:a="http://schemas.openxmlformats.org/drawingml/2006/main" xmlns:r="http://schemas.openxmlformats.org/officeDocument/2006/relationships" xmlns:p1510="http://schemas.microsoft.com/office/powerpoint/2015/10/main">
   <p1510:revLst>
-    <p1510:client id="{0E558695-5612-0947-9D3C-02716E9B19F0}" v="12" dt="2022-06-14T11:34:13.709"/>
+    <p1510:client id="{0D0CAE5E-27FE-CB2B-5991-9AB919B7992E}" v="18" dt="2022-06-14T12:57:21.940"/>
+    <p1510:client id="{0E558695-5612-0947-9D3C-02716E9B19F0}" v="14" dt="2022-06-15T06:53:31.715"/>
+    <p1510:client id="{5BFD1212-0F05-CEE7-83CF-428BF04DDBAF}" v="29" dt="2022-06-14T14:55:44.190"/>
   </p1510:revLst>
 </p1510:revInfo>
+</file>
+
+<file path=ppt/changesInfos/changesInfo1.xml><?xml version="1.0" encoding="utf-8"?>
+<pc:chgInfo xmlns:a="http://schemas.openxmlformats.org/drawingml/2006/main" xmlns:r="http://schemas.openxmlformats.org/officeDocument/2006/relationships" xmlns:ac="http://schemas.microsoft.com/office/drawing/2013/main/command" xmlns:pc="http://schemas.microsoft.com/office/powerpoint/2013/main/command">
+  <pc:docChgLst>
+    <pc:chgData name="Guest User" userId="S::urn:spo:anon#3ecf2a01105b3329403ba097ca77ef6f3b1b016a48213d7750f4caf2ce82a6e4::" providerId="AD" clId="Web-{0D0CAE5E-27FE-CB2B-5991-9AB919B7992E}"/>
+    <pc:docChg chg="modSld">
+      <pc:chgData name="Guest User" userId="S::urn:spo:anon#3ecf2a01105b3329403ba097ca77ef6f3b1b016a48213d7750f4caf2ce82a6e4::" providerId="AD" clId="Web-{0D0CAE5E-27FE-CB2B-5991-9AB919B7992E}" dt="2022-06-14T12:57:21.940" v="17" actId="20577"/>
+      <pc:docMkLst>
+        <pc:docMk/>
+      </pc:docMkLst>
+      <pc:sldChg chg="modSp">
+        <pc:chgData name="Guest User" userId="S::urn:spo:anon#3ecf2a01105b3329403ba097ca77ef6f3b1b016a48213d7750f4caf2ce82a6e4::" providerId="AD" clId="Web-{0D0CAE5E-27FE-CB2B-5991-9AB919B7992E}" dt="2022-06-14T12:57:21.940" v="17" actId="20577"/>
+        <pc:sldMkLst>
+          <pc:docMk/>
+          <pc:sldMk cId="2176484988" sldId="299"/>
+        </pc:sldMkLst>
+        <pc:spChg chg="mod">
+          <ac:chgData name="Guest User" userId="S::urn:spo:anon#3ecf2a01105b3329403ba097ca77ef6f3b1b016a48213d7750f4caf2ce82a6e4::" providerId="AD" clId="Web-{0D0CAE5E-27FE-CB2B-5991-9AB919B7992E}" dt="2022-06-14T12:57:21.940" v="17" actId="20577"/>
+          <ac:spMkLst>
+            <pc:docMk/>
+            <pc:sldMk cId="2176484988" sldId="299"/>
+            <ac:spMk id="3" creationId="{27829E6B-2183-4741-BC65-B76473E4C976}"/>
+          </ac:spMkLst>
+        </pc:spChg>
+      </pc:sldChg>
+    </pc:docChg>
+  </pc:docChgLst>
+  <pc:docChgLst>
+    <pc:chgData name="Sven van der Burg" userId="9c1d2a43-8f43-42c3-a150-992445d6e87f" providerId="ADAL" clId="{0E558695-5612-0947-9D3C-02716E9B19F0}"/>
+    <pc:docChg chg="custSel modSld">
+      <pc:chgData name="Sven van der Burg" userId="9c1d2a43-8f43-42c3-a150-992445d6e87f" providerId="ADAL" clId="{0E558695-5612-0947-9D3C-02716E9B19F0}" dt="2022-06-15T06:53:42.151" v="323" actId="20577"/>
+      <pc:docMkLst>
+        <pc:docMk/>
+      </pc:docMkLst>
+      <pc:sldChg chg="modSp mod">
+        <pc:chgData name="Sven van der Burg" userId="9c1d2a43-8f43-42c3-a150-992445d6e87f" providerId="ADAL" clId="{0E558695-5612-0947-9D3C-02716E9B19F0}" dt="2022-06-15T06:53:42.151" v="323" actId="20577"/>
+        <pc:sldMkLst>
+          <pc:docMk/>
+          <pc:sldMk cId="1106929606" sldId="298"/>
+        </pc:sldMkLst>
+        <pc:spChg chg="mod">
+          <ac:chgData name="Sven van der Burg" userId="9c1d2a43-8f43-42c3-a150-992445d6e87f" providerId="ADAL" clId="{0E558695-5612-0947-9D3C-02716E9B19F0}" dt="2022-06-15T06:53:42.151" v="323" actId="20577"/>
+          <ac:spMkLst>
+            <pc:docMk/>
+            <pc:sldMk cId="1106929606" sldId="298"/>
+            <ac:spMk id="3" creationId="{EDB40921-4AE9-9647-AD8E-20CAC95B243F}"/>
+          </ac:spMkLst>
+        </pc:spChg>
+      </pc:sldChg>
+      <pc:sldChg chg="modSp mod">
+        <pc:chgData name="Sven van der Burg" userId="9c1d2a43-8f43-42c3-a150-992445d6e87f" providerId="ADAL" clId="{0E558695-5612-0947-9D3C-02716E9B19F0}" dt="2022-06-15T06:51:17.783" v="197" actId="20577"/>
+        <pc:sldMkLst>
+          <pc:docMk/>
+          <pc:sldMk cId="2176484988" sldId="299"/>
+        </pc:sldMkLst>
+        <pc:spChg chg="mod">
+          <ac:chgData name="Sven van der Burg" userId="9c1d2a43-8f43-42c3-a150-992445d6e87f" providerId="ADAL" clId="{0E558695-5612-0947-9D3C-02716E9B19F0}" dt="2022-06-15T06:51:17.783" v="197" actId="20577"/>
+          <ac:spMkLst>
+            <pc:docMk/>
+            <pc:sldMk cId="2176484988" sldId="299"/>
+            <ac:spMk id="3" creationId="{27829E6B-2183-4741-BC65-B76473E4C976}"/>
+          </ac:spMkLst>
+        </pc:spChg>
+      </pc:sldChg>
+    </pc:docChg>
+  </pc:docChgLst>
+  <pc:docChgLst>
+    <pc:chgData name="Guest User" userId="S::urn:spo:anon#3ecf2a01105b3329403ba097ca77ef6f3b1b016a48213d7750f4caf2ce82a6e4::" providerId="AD" clId="Web-{5BFD1212-0F05-CEE7-83CF-428BF04DDBAF}"/>
+    <pc:docChg chg="modSld">
+      <pc:chgData name="Guest User" userId="S::urn:spo:anon#3ecf2a01105b3329403ba097ca77ef6f3b1b016a48213d7750f4caf2ce82a6e4::" providerId="AD" clId="Web-{5BFD1212-0F05-CEE7-83CF-428BF04DDBAF}" dt="2022-06-14T14:55:44.190" v="28" actId="20577"/>
+      <pc:docMkLst>
+        <pc:docMk/>
+      </pc:docMkLst>
+      <pc:sldChg chg="modSp">
+        <pc:chgData name="Guest User" userId="S::urn:spo:anon#3ecf2a01105b3329403ba097ca77ef6f3b1b016a48213d7750f4caf2ce82a6e4::" providerId="AD" clId="Web-{5BFD1212-0F05-CEE7-83CF-428BF04DDBAF}" dt="2022-06-14T14:55:44.190" v="28" actId="20577"/>
+        <pc:sldMkLst>
+          <pc:docMk/>
+          <pc:sldMk cId="1106929606" sldId="298"/>
+        </pc:sldMkLst>
+        <pc:spChg chg="mod">
+          <ac:chgData name="Guest User" userId="S::urn:spo:anon#3ecf2a01105b3329403ba097ca77ef6f3b1b016a48213d7750f4caf2ce82a6e4::" providerId="AD" clId="Web-{5BFD1212-0F05-CEE7-83CF-428BF04DDBAF}" dt="2022-06-14T14:55:44.190" v="28" actId="20577"/>
+          <ac:spMkLst>
+            <pc:docMk/>
+            <pc:sldMk cId="1106929606" sldId="298"/>
+            <ac:spMk id="3" creationId="{EDB40921-4AE9-9647-AD8E-20CAC95B243F}"/>
+          </ac:spMkLst>
+        </pc:spChg>
+      </pc:sldChg>
+    </pc:docChg>
+  </pc:docChgLst>
+</pc:chgInfo>
 </file>
 
 <file path=ppt/notesMasters/notesMaster1.xml><?xml version="1.0" encoding="utf-8"?>
@@ -5065,7 +5159,7 @@
           <a:lstStyle/>
           <a:p>
             <a:r>
-              <a:rPr lang="en-NL" dirty="0"/>
+              <a:rPr lang="en-NL"/>
               <a:t>The assignment</a:t>
             </a:r>
           </a:p>
@@ -5089,7 +5183,9 @@
         </p:nvSpPr>
         <p:spPr/>
         <p:txBody>
-          <a:bodyPr/>
+          <a:bodyPr vert="horz" lIns="91440" tIns="45720" rIns="91440" bIns="45720" rtlCol="0" anchor="t">
+            <a:noAutofit/>
+          </a:bodyPr>
           <a:lstStyle/>
           <a:p>
             <a:pPr marL="0" indent="0">
@@ -5107,21 +5203,48 @@
             </a:pPr>
             <a:r>
               <a:rPr lang="en-NL" dirty="0"/>
-              <a:t>Pick an interesting problem that you can solve:</a:t>
-            </a:r>
+              <a:t>Pick a problem:</a:t>
+            </a:r>
+            <a:endParaRPr lang="en-NL" dirty="0">
+              <a:cs typeface="Assistant"/>
+            </a:endParaRPr>
           </a:p>
           <a:p>
             <a:pPr lvl="1"/>
             <a:r>
-              <a:rPr lang="en-NL" dirty="0"/>
-              <a:t>Using the available data</a:t>
+              <a:rPr lang="en-NL" dirty="0">
+                <a:cs typeface="Assistant"/>
+              </a:rPr>
+              <a:t>Predict gross salary in 2021 (</a:t>
+            </a:r>
+            <a:r>
+              <a:rPr lang="en-GB" dirty="0"/>
+              <a:t>bruttoinc_imputed.21) given the data from 2011 </a:t>
+            </a:r>
+            <a:r>
+              <a:rPr lang="en-NL" dirty="0">
+                <a:cs typeface="Assistant"/>
+              </a:rPr>
+              <a:t>(regression problem)</a:t>
             </a:r>
           </a:p>
           <a:p>
             <a:pPr lvl="1"/>
             <a:r>
-              <a:rPr lang="en-NL" dirty="0"/>
-              <a:t>Using machine learning</a:t>
+              <a:rPr lang="en-NL" dirty="0">
+                <a:cs typeface="Assistant"/>
+              </a:rPr>
+              <a:t>Predict contract type in 2021 (</a:t>
+            </a:r>
+            <a:r>
+              <a:rPr lang="en-GB" dirty="0"/>
+              <a:t>status.contract.21)</a:t>
+            </a:r>
+            <a:r>
+              <a:rPr lang="en-NL" dirty="0">
+                <a:cs typeface="Assistant"/>
+              </a:rPr>
+              <a:t> given the data from 2011 (classification problem)</a:t>
             </a:r>
           </a:p>
           <a:p>
@@ -5133,6 +5256,9 @@
               <a:rPr lang="en-NL" dirty="0"/>
               <a:t>Solve the problem as best as you can!</a:t>
             </a:r>
+            <a:endParaRPr lang="en-NL" dirty="0">
+              <a:cs typeface="Assistant"/>
+            </a:endParaRPr>
           </a:p>
         </p:txBody>
       </p:sp>
@@ -5212,91 +5338,132 @@
         </p:nvSpPr>
         <p:spPr>
           <a:xfrm>
-            <a:off x="838200" y="1825625"/>
-            <a:ext cx="7096950" cy="4351338"/>
+            <a:off x="838200" y="1825624"/>
+            <a:ext cx="7096950" cy="4519419"/>
           </a:xfrm>
         </p:spPr>
         <p:txBody>
-          <a:bodyPr/>
-          <a:lstStyle/>
-          <a:p>
-            <a:r>
-              <a:rPr lang="en-NL" dirty="0"/>
+          <a:bodyPr vert="horz" lIns="91440" tIns="45720" rIns="91440" bIns="45720" rtlCol="0" anchor="t">
+            <a:noAutofit/>
+          </a:bodyPr>
+          <a:lstStyle/>
+          <a:p>
+            <a:r>
+              <a:rPr lang="en-NL" sz="2400" dirty="0"/>
               <a:t>Today:</a:t>
             </a:r>
+            <a:endParaRPr lang="en-US" sz="2400" dirty="0">
+              <a:cs typeface="Assistant"/>
+            </a:endParaRPr>
           </a:p>
           <a:p>
             <a:pPr lvl="1"/>
             <a:r>
-              <a:rPr lang="en-NL" dirty="0"/>
+              <a:rPr lang="en-NL" sz="2000" dirty="0"/>
               <a:t>15:00-15:30 </a:t>
             </a:r>
             <a:r>
-              <a:rPr lang="en-NL" dirty="0">
+              <a:rPr lang="en-NL" sz="2000" dirty="0">
                 <a:sym typeface="Wingdings" pitchFamily="2" charset="2"/>
               </a:rPr>
               <a:t> Pick a problem, checkin with someone from the instructor team</a:t>
             </a:r>
+            <a:endParaRPr lang="en-NL" sz="2000" dirty="0">
+              <a:cs typeface="Assistant"/>
+            </a:endParaRPr>
           </a:p>
           <a:p>
             <a:pPr lvl="1"/>
             <a:r>
-              <a:rPr lang="en-NL" dirty="0">
+              <a:rPr lang="en-NL" sz="2000" dirty="0">
                 <a:sym typeface="Wingdings" pitchFamily="2" charset="2"/>
               </a:rPr>
               <a:t>15:30-16:00  Exploratory data analysis + prepare the data</a:t>
             </a:r>
-          </a:p>
-          <a:p>
-            <a:r>
-              <a:rPr lang="en-NL" dirty="0">
+            <a:endParaRPr lang="en-NL" sz="2000" dirty="0">
+              <a:cs typeface="Assistant"/>
+            </a:endParaRPr>
+          </a:p>
+          <a:p>
+            <a:r>
+              <a:rPr lang="en-NL" sz="2400" dirty="0">
                 <a:sym typeface="Wingdings" pitchFamily="2" charset="2"/>
               </a:rPr>
               <a:t>Tomorrow:</a:t>
             </a:r>
+            <a:endParaRPr lang="en-NL" sz="2400" dirty="0">
+              <a:cs typeface="Assistant"/>
+            </a:endParaRPr>
           </a:p>
           <a:p>
             <a:pPr lvl="1"/>
-            <a:r>
-              <a:rPr lang="en-NL" dirty="0">
-                <a:sym typeface="Wingdings" pitchFamily="2" charset="2"/>
-              </a:rPr>
-              <a:t>??:??  Train and evaluate your first model</a:t>
-            </a:r>
-          </a:p>
-          <a:p>
-            <a:pPr lvl="1"/>
-            <a:r>
-              <a:rPr lang="en-NL" dirty="0">
-                <a:sym typeface="Wingdings" pitchFamily="2" charset="2"/>
-              </a:rPr>
-              <a:t>??:??  Iterate and try to improve your model</a:t>
-            </a:r>
-          </a:p>
-          <a:p>
-            <a:pPr marL="0" indent="0">
-              <a:buNone/>
-            </a:pPr>
             <a:r>
               <a:rPr lang="en-NL" sz="2000" dirty="0">
                 <a:sym typeface="Wingdings" pitchFamily="2" charset="2"/>
               </a:rPr>
-              <a:t>NB1: Don’t shy away from taking shortcuts in any of these steps, try to get a first baseline model as soon as possible!</a:t>
-            </a:r>
-          </a:p>
-          <a:p>
-            <a:pPr marL="0" indent="0">
-              <a:buNone/>
-            </a:pPr>
+              <a:t>12:30-14:20  Train and evaluate your first model</a:t>
+            </a:r>
+            <a:endParaRPr lang="en-NL" sz="2000" dirty="0">
+              <a:cs typeface="Assistant"/>
+            </a:endParaRPr>
+          </a:p>
+          <a:p>
+            <a:pPr lvl="1"/>
             <a:r>
               <a:rPr lang="en-NL" sz="2000" dirty="0">
                 <a:sym typeface="Wingdings" pitchFamily="2" charset="2"/>
               </a:rPr>
-              <a:t>NB2: Use the instructor team!</a:t>
-            </a:r>
-            <a:endParaRPr lang="en-NL" dirty="0">
-              <a:sym typeface="Wingdings" pitchFamily="2" charset="2"/>
+              <a:t>14:40:16:00  Iterate and try to improve your model</a:t>
+            </a:r>
+            <a:endParaRPr lang="en-NL" sz="2000" dirty="0">
+              <a:cs typeface="Assistant"/>
             </a:endParaRPr>
+          </a:p>
+          <a:p>
+            <a:pPr marL="0" indent="0">
+              <a:buNone/>
+            </a:pPr>
+            <a:r>
+              <a:rPr lang="en-NL" sz="1800" dirty="0">
+                <a:sym typeface="Wingdings" pitchFamily="2" charset="2"/>
+              </a:rPr>
+              <a:t>Guidelines: </a:t>
+            </a:r>
+          </a:p>
+          <a:p>
+            <a:r>
+              <a:rPr lang="en-NL" sz="1800" dirty="0">
+                <a:sym typeface="Wingdings" pitchFamily="2" charset="2"/>
+              </a:rPr>
+              <a:t>Don’t shy away from taking shortcuts in any of these steps, try to get a first baseline model as soon as possible! For example:</a:t>
+            </a:r>
+          </a:p>
+          <a:p>
+            <a:pPr lvl="1"/>
+            <a:r>
+              <a:rPr lang="en-NL" sz="1400" dirty="0">
+                <a:cs typeface="Assistant"/>
+                <a:sym typeface="Wingdings" pitchFamily="2" charset="2"/>
+              </a:rPr>
+              <a:t>Start with a subset of the features (for example 5)</a:t>
+            </a:r>
+          </a:p>
+          <a:p>
+            <a:pPr lvl="1"/>
+            <a:endParaRPr lang="en-NL" sz="1400" dirty="0">
+              <a:cs typeface="Assistant"/>
+            </a:endParaRPr>
+          </a:p>
+          <a:p>
+            <a:pPr marL="0" indent="0">
+              <a:buNone/>
+            </a:pPr>
+            <a:r>
+              <a:rPr lang="en-NL" sz="1800" dirty="0">
+                <a:sym typeface="Wingdings" pitchFamily="2" charset="2"/>
+              </a:rPr>
+              <a:t>NB: The instructor team is here to help you out!</a:t>
+            </a:r>
           </a:p>
           <a:p>
             <a:pPr lvl="1"/>
@@ -5863,29 +6030,6 @@
 </file>
 
 <file path=customXml/item1.xml><?xml version="1.0" encoding="utf-8"?>
-<p:properties xmlns:p="http://schemas.microsoft.com/office/2006/metadata/properties" xmlns:xsi="http://www.w3.org/2001/XMLSchema-instance" xmlns:pc="http://schemas.microsoft.com/office/infopath/2007/PartnerControls">
-  <documentManagement>
-    <lcf76f155ced4ddcb4097134ff3c332f xmlns="af34c8a9-9806-44d6-aa44-d772f2793323">
-      <Terms xmlns="http://schemas.microsoft.com/office/infopath/2007/PartnerControls"/>
-    </lcf76f155ced4ddcb4097134ff3c332f>
-    <TaxCatchAll xmlns="26898810-f9b9-406f-8188-8f8f7cdf5520" xsi:nil="true"/>
-    <SharedWithUsers xmlns="26898810-f9b9-406f-8188-8f8f7cdf5520">
-      <UserInfo>
-        <DisplayName>Meijer, E. (PHEG)</DisplayName>
-        <AccountId>58</AccountId>
-        <AccountType/>
-      </UserInfo>
-      <UserInfo>
-        <DisplayName>Sven van der Burg</DisplayName>
-        <AccountId>24</AccountId>
-        <AccountType/>
-      </UserInfo>
-    </SharedWithUsers>
-  </documentManagement>
-</p:properties>
-</file>
-
-<file path=customXml/item2.xml><?xml version="1.0" encoding="utf-8"?>
 <?mso-contentType ?>
 <FormTemplates xmlns="http://schemas.microsoft.com/sharepoint/v3/contenttype/forms">
   <Display>DocumentLibraryForm</Display>
@@ -5894,7 +6038,7 @@
 </FormTemplates>
 </file>
 
-<file path=customXml/item3.xml><?xml version="1.0" encoding="utf-8"?>
+<file path=customXml/item2.xml><?xml version="1.0" encoding="utf-8"?>
 <ct:contentTypeSchema xmlns:ct="http://schemas.microsoft.com/office/2006/metadata/contentType" xmlns:ma="http://schemas.microsoft.com/office/2006/metadata/properties/metaAttributes" ct:_="" ma:_="" ma:contentTypeName="Document" ma:contentTypeID="0x01010097164C23EC47024F97AA423E75479F12" ma:contentTypeVersion="16" ma:contentTypeDescription="Create a new document." ma:contentTypeScope="" ma:versionID="a3556cdf3cb0a10d0be023fe9715bf40">
   <xsd:schema xmlns:xsd="http://www.w3.org/2001/XMLSchema" xmlns:xs="http://www.w3.org/2001/XMLSchema" xmlns:p="http://schemas.microsoft.com/office/2006/metadata/properties" xmlns:ns2="af34c8a9-9806-44d6-aa44-d772f2793323" xmlns:ns3="26898810-f9b9-406f-8188-8f8f7cdf5520" targetNamespace="http://schemas.microsoft.com/office/2006/metadata/properties" ma:root="true" ma:fieldsID="e60ec4d90372c9dd7f865339ba7db329" ns2:_="" ns3:_="">
     <xsd:import namespace="af34c8a9-9806-44d6-aa44-d772f2793323"/>
@@ -6131,24 +6275,30 @@
 </ct:contentTypeSchema>
 </file>
 
-<file path=customXml/itemProps1.xml><?xml version="1.0" encoding="utf-8"?>
-<ds:datastoreItem xmlns:ds="http://schemas.openxmlformats.org/officeDocument/2006/customXml" ds:itemID="{70FF6FBF-B4F4-49AD-A88B-091F94ABFAFA}">
-  <ds:schemaRefs>
-    <ds:schemaRef ds:uri="http://purl.org/dc/elements/1.1/"/>
-    <ds:schemaRef ds:uri="http://schemas.microsoft.com/office/2006/metadata/properties"/>
-    <ds:schemaRef ds:uri="http://schemas.microsoft.com/office/2006/documentManagement/types"/>
-    <ds:schemaRef ds:uri="http://purl.org/dc/terms/"/>
-    <ds:schemaRef ds:uri="http://purl.org/dc/dcmitype/"/>
-    <ds:schemaRef ds:uri="af34c8a9-9806-44d6-aa44-d772f2793323"/>
-    <ds:schemaRef ds:uri="http://schemas.microsoft.com/office/infopath/2007/PartnerControls"/>
-    <ds:schemaRef ds:uri="http://schemas.openxmlformats.org/package/2006/metadata/core-properties"/>
-    <ds:schemaRef ds:uri="26898810-f9b9-406f-8188-8f8f7cdf5520"/>
-    <ds:schemaRef ds:uri="http://www.w3.org/XML/1998/namespace"/>
-  </ds:schemaRefs>
-</ds:datastoreItem>
+<file path=customXml/item3.xml><?xml version="1.0" encoding="utf-8"?>
+<p:properties xmlns:p="http://schemas.microsoft.com/office/2006/metadata/properties" xmlns:xsi="http://www.w3.org/2001/XMLSchema-instance" xmlns:pc="http://schemas.microsoft.com/office/infopath/2007/PartnerControls">
+  <documentManagement>
+    <lcf76f155ced4ddcb4097134ff3c332f xmlns="af34c8a9-9806-44d6-aa44-d772f2793323">
+      <Terms xmlns="http://schemas.microsoft.com/office/infopath/2007/PartnerControls"/>
+    </lcf76f155ced4ddcb4097134ff3c332f>
+    <TaxCatchAll xmlns="26898810-f9b9-406f-8188-8f8f7cdf5520" xsi:nil="true"/>
+    <SharedWithUsers xmlns="26898810-f9b9-406f-8188-8f8f7cdf5520">
+      <UserInfo>
+        <DisplayName>Meijer, E. (PHEG)</DisplayName>
+        <AccountId>58</AccountId>
+        <AccountType/>
+      </UserInfo>
+      <UserInfo>
+        <DisplayName>Sven van der Burg</DisplayName>
+        <AccountId>24</AccountId>
+        <AccountType/>
+      </UserInfo>
+    </SharedWithUsers>
+  </documentManagement>
+</p:properties>
 </file>
 
-<file path=customXml/itemProps2.xml><?xml version="1.0" encoding="utf-8"?>
+<file path=customXml/itemProps1.xml><?xml version="1.0" encoding="utf-8"?>
 <ds:datastoreItem xmlns:ds="http://schemas.openxmlformats.org/officeDocument/2006/customXml" ds:itemID="{B72CECC3-7DC2-48A3-A34C-CF77ADEDD298}">
   <ds:schemaRefs>
     <ds:schemaRef ds:uri="http://schemas.microsoft.com/sharepoint/v3/contenttype/forms"/>
@@ -6156,21 +6306,38 @@
 </ds:datastoreItem>
 </file>
 
-<file path=customXml/itemProps3.xml><?xml version="1.0" encoding="utf-8"?>
+<file path=customXml/itemProps2.xml><?xml version="1.0" encoding="utf-8"?>
 <ds:datastoreItem xmlns:ds="http://schemas.openxmlformats.org/officeDocument/2006/customXml" ds:itemID="{FE60F047-FD66-419C-9B3C-A586DA10541A}">
   <ds:schemaRefs>
-    <ds:schemaRef ds:uri="http://schemas.microsoft.com/office/2006/metadata/contentType"/>
-    <ds:schemaRef ds:uri="http://schemas.microsoft.com/office/2006/metadata/properties/metaAttributes"/>
-    <ds:schemaRef ds:uri="http://www.w3.org/2001/XMLSchema"/>
-    <ds:schemaRef ds:uri="http://schemas.microsoft.com/office/2006/metadata/properties"/>
+    <ds:schemaRef ds:uri="26898810-f9b9-406f-8188-8f8f7cdf5520"/>
     <ds:schemaRef ds:uri="af34c8a9-9806-44d6-aa44-d772f2793323"/>
-    <ds:schemaRef ds:uri="26898810-f9b9-406f-8188-8f8f7cdf5520"/>
-    <ds:schemaRef ds:uri="http://schemas.microsoft.com/office/2006/documentManagement/types"/>
-    <ds:schemaRef ds:uri="http://schemas.microsoft.com/office/infopath/2007/PartnerControls"/>
-    <ds:schemaRef ds:uri="http://schemas.openxmlformats.org/package/2006/metadata/core-properties"/>
     <ds:schemaRef ds:uri="http://purl.org/dc/elements/1.1/"/>
     <ds:schemaRef ds:uri="http://purl.org/dc/terms/"/>
     <ds:schemaRef ds:uri="http://schemas.microsoft.com/internal/obd"/>
+    <ds:schemaRef ds:uri="http://schemas.microsoft.com/office/2006/documentManagement/types"/>
+    <ds:schemaRef ds:uri="http://schemas.microsoft.com/office/2006/metadata/contentType"/>
+    <ds:schemaRef ds:uri="http://schemas.microsoft.com/office/2006/metadata/properties"/>
+    <ds:schemaRef ds:uri="http://schemas.microsoft.com/office/2006/metadata/properties/metaAttributes"/>
+    <ds:schemaRef ds:uri="http://schemas.microsoft.com/office/infopath/2007/PartnerControls"/>
+    <ds:schemaRef ds:uri="http://schemas.openxmlformats.org/package/2006/metadata/core-properties"/>
+    <ds:schemaRef ds:uri="http://www.w3.org/2001/XMLSchema"/>
+  </ds:schemaRefs>
+</ds:datastoreItem>
+</file>
+
+<file path=customXml/itemProps3.xml><?xml version="1.0" encoding="utf-8"?>
+<ds:datastoreItem xmlns:ds="http://schemas.openxmlformats.org/officeDocument/2006/customXml" ds:itemID="{70FF6FBF-B4F4-49AD-A88B-091F94ABFAFA}">
+  <ds:schemaRefs>
+    <ds:schemaRef ds:uri="26898810-f9b9-406f-8188-8f8f7cdf5520"/>
+    <ds:schemaRef ds:uri="af34c8a9-9806-44d6-aa44-d772f2793323"/>
+    <ds:schemaRef ds:uri="http://purl.org/dc/dcmitype/"/>
+    <ds:schemaRef ds:uri="http://purl.org/dc/elements/1.1/"/>
+    <ds:schemaRef ds:uri="http://purl.org/dc/terms/"/>
+    <ds:schemaRef ds:uri="http://schemas.microsoft.com/office/2006/documentManagement/types"/>
+    <ds:schemaRef ds:uri="http://schemas.microsoft.com/office/2006/metadata/properties"/>
+    <ds:schemaRef ds:uri="http://schemas.microsoft.com/office/infopath/2007/PartnerControls"/>
+    <ds:schemaRef ds:uri="http://schemas.openxmlformats.org/package/2006/metadata/core-properties"/>
+    <ds:schemaRef ds:uri="http://www.w3.org/XML/1998/namespace"/>
   </ds:schemaRefs>
 </ds:datastoreItem>
 </file>
</xml_diff>

<commit_message>
Update real-world exercise slides
</commit_message>
<xml_diff>
--- a/files/apply-skills-to-liss-dataset-exercise.pptx
+++ b/files/apply-skills-to-liss-dataset-exercise.pptx
@@ -178,7 +178,7 @@
   <pc:docChgLst>
     <pc:chgData name="Sven van der Burg" userId="9c1d2a43-8f43-42c3-a150-992445d6e87f" providerId="ADAL" clId="{0E558695-5612-0947-9D3C-02716E9B19F0}"/>
     <pc:docChg chg="custSel modSld">
-      <pc:chgData name="Sven van der Burg" userId="9c1d2a43-8f43-42c3-a150-992445d6e87f" providerId="ADAL" clId="{0E558695-5612-0947-9D3C-02716E9B19F0}" dt="2022-06-15T06:53:42.151" v="323" actId="20577"/>
+      <pc:chgData name="Sven van der Burg" userId="9c1d2a43-8f43-42c3-a150-992445d6e87f" providerId="ADAL" clId="{0E558695-5612-0947-9D3C-02716E9B19F0}" dt="2022-06-15T09:56:14.270" v="405" actId="20577"/>
       <pc:docMkLst>
         <pc:docMk/>
       </pc:docMkLst>
@@ -198,13 +198,13 @@
         </pc:spChg>
       </pc:sldChg>
       <pc:sldChg chg="modSp mod">
-        <pc:chgData name="Sven van der Burg" userId="9c1d2a43-8f43-42c3-a150-992445d6e87f" providerId="ADAL" clId="{0E558695-5612-0947-9D3C-02716E9B19F0}" dt="2022-06-15T06:51:17.783" v="197" actId="20577"/>
+        <pc:chgData name="Sven van der Burg" userId="9c1d2a43-8f43-42c3-a150-992445d6e87f" providerId="ADAL" clId="{0E558695-5612-0947-9D3C-02716E9B19F0}" dt="2022-06-15T09:56:14.270" v="405" actId="20577"/>
         <pc:sldMkLst>
           <pc:docMk/>
           <pc:sldMk cId="2176484988" sldId="299"/>
         </pc:sldMkLst>
         <pc:spChg chg="mod">
-          <ac:chgData name="Sven van der Burg" userId="9c1d2a43-8f43-42c3-a150-992445d6e87f" providerId="ADAL" clId="{0E558695-5612-0947-9D3C-02716E9B19F0}" dt="2022-06-15T06:51:17.783" v="197" actId="20577"/>
+          <ac:chgData name="Sven van der Burg" userId="9c1d2a43-8f43-42c3-a150-992445d6e87f" providerId="ADAL" clId="{0E558695-5612-0947-9D3C-02716E9B19F0}" dt="2022-06-15T09:56:14.270" v="405" actId="20577"/>
           <ac:spMkLst>
             <pc:docMk/>
             <pc:sldMk cId="2176484988" sldId="299"/>
@@ -5360,13 +5360,13 @@
             <a:pPr lvl="1"/>
             <a:r>
               <a:rPr lang="en-NL" sz="2000" dirty="0"/>
-              <a:t>15:00-15:30 </a:t>
+              <a:t>15:00-15:10 </a:t>
             </a:r>
             <a:r>
               <a:rPr lang="en-NL" sz="2000" dirty="0">
                 <a:sym typeface="Wingdings" pitchFamily="2" charset="2"/>
               </a:rPr>
-              <a:t> Pick a problem, checkin with someone from the instructor team</a:t>
+              <a:t> Define the problem</a:t>
             </a:r>
             <a:endParaRPr lang="en-NL" sz="2000" dirty="0">
               <a:cs typeface="Assistant"/>
@@ -5378,7 +5378,7 @@
               <a:rPr lang="en-NL" sz="2000" dirty="0">
                 <a:sym typeface="Wingdings" pitchFamily="2" charset="2"/>
               </a:rPr>
-              <a:t>15:30-16:00  Exploratory data analysis + prepare the data</a:t>
+              <a:t>15:10-16:00  Exploratory data analysis + prepare the data</a:t>
             </a:r>
             <a:endParaRPr lang="en-NL" sz="2000" dirty="0">
               <a:cs typeface="Assistant"/>
@@ -5447,6 +5447,51 @@
               </a:rPr>
               <a:t>Start with a subset of the features (for example 5)</a:t>
             </a:r>
+          </a:p>
+          <a:p>
+            <a:pPr lvl="1"/>
+            <a:r>
+              <a:rPr lang="en-NL" sz="1400" dirty="0">
+                <a:cs typeface="Assistant"/>
+                <a:sym typeface="Wingdings" pitchFamily="2" charset="2"/>
+              </a:rPr>
+              <a:t>S</a:t>
+            </a:r>
+            <a:r>
+              <a:rPr lang="en-GB" sz="1400" dirty="0">
+                <a:cs typeface="Assistant"/>
+                <a:sym typeface="Wingdings" pitchFamily="2" charset="2"/>
+              </a:rPr>
+              <a:t>t</a:t>
+            </a:r>
+            <a:r>
+              <a:rPr lang="en-NL" sz="1400" dirty="0">
+                <a:cs typeface="Assistant"/>
+                <a:sym typeface="Wingdings" pitchFamily="2" charset="2"/>
+              </a:rPr>
+              <a:t>art </a:t>
+            </a:r>
+            <a:r>
+              <a:rPr lang="en-NL" sz="1400">
+                <a:cs typeface="Assistant"/>
+                <a:sym typeface="Wingdings" pitchFamily="2" charset="2"/>
+              </a:rPr>
+              <a:t>with approaches </a:t>
+            </a:r>
+            <a:r>
+              <a:rPr lang="en-NL" sz="1400" dirty="0">
+                <a:cs typeface="Assistant"/>
+                <a:sym typeface="Wingdings" pitchFamily="2" charset="2"/>
+              </a:rPr>
+              <a:t>you know</a:t>
+            </a:r>
+          </a:p>
+          <a:p>
+            <a:pPr lvl="1"/>
+            <a:endParaRPr lang="en-NL" sz="1400" dirty="0">
+              <a:cs typeface="Assistant"/>
+              <a:sym typeface="Wingdings" pitchFamily="2" charset="2"/>
+            </a:endParaRPr>
           </a:p>
           <a:p>
             <a:pPr lvl="1"/>

</xml_diff>

<commit_message>
Update real-world-problem-exercise slides according to Javier
</commit_message>
<xml_diff>
--- a/files/apply-skills-to-liss-dataset-exercise.pptx
+++ b/files/apply-skills-to-liss-dataset-exercise.pptx
@@ -143,7 +143,7 @@
 <p1510:revInfo xmlns:a="http://schemas.openxmlformats.org/drawingml/2006/main" xmlns:r="http://schemas.openxmlformats.org/officeDocument/2006/relationships" xmlns:p1510="http://schemas.microsoft.com/office/powerpoint/2015/10/main">
   <p1510:revLst>
     <p1510:client id="{0D0CAE5E-27FE-CB2B-5991-9AB919B7992E}" v="18" dt="2022-06-14T12:57:21.940"/>
-    <p1510:client id="{0E558695-5612-0947-9D3C-02716E9B19F0}" v="14" dt="2022-06-15T06:53:31.715"/>
+    <p1510:client id="{0E558695-5612-0947-9D3C-02716E9B19F0}" v="15" dt="2022-06-15T11:32:06.132"/>
     <p1510:client id="{5BFD1212-0F05-CEE7-83CF-428BF04DDBAF}" v="29" dt="2022-06-14T14:55:44.190"/>
   </p1510:revLst>
 </p1510:revInfo>
@@ -178,7 +178,7 @@
   <pc:docChgLst>
     <pc:chgData name="Sven van der Burg" userId="9c1d2a43-8f43-42c3-a150-992445d6e87f" providerId="ADAL" clId="{0E558695-5612-0947-9D3C-02716E9B19F0}"/>
     <pc:docChg chg="custSel modSld">
-      <pc:chgData name="Sven van der Burg" userId="9c1d2a43-8f43-42c3-a150-992445d6e87f" providerId="ADAL" clId="{0E558695-5612-0947-9D3C-02716E9B19F0}" dt="2022-06-15T09:56:14.270" v="405" actId="20577"/>
+      <pc:chgData name="Sven van der Burg" userId="9c1d2a43-8f43-42c3-a150-992445d6e87f" providerId="ADAL" clId="{0E558695-5612-0947-9D3C-02716E9B19F0}" dt="2022-06-15T11:32:31.084" v="565" actId="20577"/>
       <pc:docMkLst>
         <pc:docMk/>
       </pc:docMkLst>
@@ -198,19 +198,27 @@
         </pc:spChg>
       </pc:sldChg>
       <pc:sldChg chg="modSp mod">
-        <pc:chgData name="Sven van der Burg" userId="9c1d2a43-8f43-42c3-a150-992445d6e87f" providerId="ADAL" clId="{0E558695-5612-0947-9D3C-02716E9B19F0}" dt="2022-06-15T09:56:14.270" v="405" actId="20577"/>
+        <pc:chgData name="Sven van der Burg" userId="9c1d2a43-8f43-42c3-a150-992445d6e87f" providerId="ADAL" clId="{0E558695-5612-0947-9D3C-02716E9B19F0}" dt="2022-06-15T11:32:31.084" v="565" actId="20577"/>
         <pc:sldMkLst>
           <pc:docMk/>
           <pc:sldMk cId="2176484988" sldId="299"/>
         </pc:sldMkLst>
         <pc:spChg chg="mod">
-          <ac:chgData name="Sven van der Burg" userId="9c1d2a43-8f43-42c3-a150-992445d6e87f" providerId="ADAL" clId="{0E558695-5612-0947-9D3C-02716E9B19F0}" dt="2022-06-15T09:56:14.270" v="405" actId="20577"/>
+          <ac:chgData name="Sven van der Burg" userId="9c1d2a43-8f43-42c3-a150-992445d6e87f" providerId="ADAL" clId="{0E558695-5612-0947-9D3C-02716E9B19F0}" dt="2022-06-15T11:32:31.084" v="565" actId="20577"/>
           <ac:spMkLst>
             <pc:docMk/>
             <pc:sldMk cId="2176484988" sldId="299"/>
             <ac:spMk id="3" creationId="{27829E6B-2183-4741-BC65-B76473E4C976}"/>
           </ac:spMkLst>
         </pc:spChg>
+        <pc:picChg chg="mod">
+          <ac:chgData name="Sven van der Burg" userId="9c1d2a43-8f43-42c3-a150-992445d6e87f" providerId="ADAL" clId="{0E558695-5612-0947-9D3C-02716E9B19F0}" dt="2022-06-15T11:32:06.132" v="516" actId="1076"/>
+          <ac:picMkLst>
+            <pc:docMk/>
+            <pc:sldMk cId="2176484988" sldId="299"/>
+            <ac:picMk id="4098" creationId="{CE7931D4-BDBA-F048-91B9-87800EDC86F4}"/>
+          </ac:picMkLst>
+        </pc:picChg>
       </pc:sldChg>
     </pc:docChg>
   </pc:docChgLst>
@@ -323,7 +331,7 @@
           <a:p>
             <a:fld id="{E898B6B7-24FA-4A85-AF3E-2867A2B6FAE8}" type="datetimeFigureOut">
               <a:rPr lang="en-NL" smtClean="0"/>
-              <a:t>14/06/2022</a:t>
+              <a:t>15/06/2022</a:t>
             </a:fld>
             <a:endParaRPr lang="en-NL"/>
           </a:p>
@@ -756,7 +764,7 @@
           <a:p>
             <a:fld id="{EA730EFB-AB28-4A68-9CF2-24FEA7CF3D98}" type="datetimeFigureOut">
               <a:rPr lang="en-US" smtClean="0"/>
-              <a:t>6/14/22</a:t>
+              <a:t>6/15/22</a:t>
             </a:fld>
             <a:endParaRPr lang="en-US"/>
           </a:p>
@@ -968,7 +976,7 @@
           <a:p>
             <a:fld id="{EA730EFB-AB28-4A68-9CF2-24FEA7CF3D98}" type="datetimeFigureOut">
               <a:rPr lang="en-US" smtClean="0"/>
-              <a:t>6/14/22</a:t>
+              <a:t>6/15/22</a:t>
             </a:fld>
             <a:endParaRPr lang="en-US"/>
           </a:p>
@@ -1206,7 +1214,7 @@
           <a:p>
             <a:fld id="{EA730EFB-AB28-4A68-9CF2-24FEA7CF3D98}" type="datetimeFigureOut">
               <a:rPr lang="en-US" smtClean="0"/>
-              <a:t>6/14/22</a:t>
+              <a:t>6/15/22</a:t>
             </a:fld>
             <a:endParaRPr lang="en-US"/>
           </a:p>
@@ -1437,7 +1445,7 @@
           <a:p>
             <a:fld id="{EA730EFB-AB28-4A68-9CF2-24FEA7CF3D98}" type="datetimeFigureOut">
               <a:rPr lang="en-US" smtClean="0"/>
-              <a:t>6/14/22</a:t>
+              <a:t>6/15/22</a:t>
             </a:fld>
             <a:endParaRPr lang="en-US"/>
           </a:p>
@@ -1858,7 +1866,7 @@
           <a:p>
             <a:fld id="{EA730EFB-AB28-4A68-9CF2-24FEA7CF3D98}" type="datetimeFigureOut">
               <a:rPr lang="en-US" smtClean="0"/>
-              <a:t>6/14/22</a:t>
+              <a:t>6/15/22</a:t>
             </a:fld>
             <a:endParaRPr lang="en-US"/>
           </a:p>
@@ -2058,7 +2066,7 @@
           <a:p>
             <a:fld id="{EA730EFB-AB28-4A68-9CF2-24FEA7CF3D98}" type="datetimeFigureOut">
               <a:rPr lang="en-US" smtClean="0"/>
-              <a:t>6/14/22</a:t>
+              <a:t>6/15/22</a:t>
             </a:fld>
             <a:endParaRPr lang="en-US"/>
           </a:p>
@@ -2528,7 +2536,7 @@
           <a:p>
             <a:fld id="{EA730EFB-AB28-4A68-9CF2-24FEA7CF3D98}" type="datetimeFigureOut">
               <a:rPr lang="en-US" smtClean="0"/>
-              <a:t>6/14/22</a:t>
+              <a:t>6/15/22</a:t>
             </a:fld>
             <a:endParaRPr lang="en-US"/>
           </a:p>
@@ -2766,7 +2774,7 @@
           <a:p>
             <a:fld id="{EA730EFB-AB28-4A68-9CF2-24FEA7CF3D98}" type="datetimeFigureOut">
               <a:rPr lang="en-US" smtClean="0"/>
-              <a:t>6/14/22</a:t>
+              <a:t>6/15/22</a:t>
             </a:fld>
             <a:endParaRPr lang="en-US"/>
           </a:p>
@@ -3072,7 +3080,7 @@
           <a:p>
             <a:fld id="{EA730EFB-AB28-4A68-9CF2-24FEA7CF3D98}" type="datetimeFigureOut">
               <a:rPr lang="en-US" smtClean="0"/>
-              <a:t>6/14/22</a:t>
+              <a:t>6/15/22</a:t>
             </a:fld>
             <a:endParaRPr lang="en-US"/>
           </a:p>
@@ -3359,7 +3367,7 @@
           <a:p>
             <a:fld id="{EA730EFB-AB28-4A68-9CF2-24FEA7CF3D98}" type="datetimeFigureOut">
               <a:rPr lang="en-US" smtClean="0"/>
-              <a:t>6/14/22</a:t>
+              <a:t>6/15/22</a:t>
             </a:fld>
             <a:endParaRPr lang="en-US"/>
           </a:p>
@@ -3571,7 +3579,7 @@
           <a:p>
             <a:fld id="{EA730EFB-AB28-4A68-9CF2-24FEA7CF3D98}" type="datetimeFigureOut">
               <a:rPr lang="en-US" smtClean="0"/>
-              <a:t>6/14/22</a:t>
+              <a:t>6/15/22</a:t>
             </a:fld>
             <a:endParaRPr lang="en-US"/>
           </a:p>
@@ -3783,7 +3791,7 @@
           <a:p>
             <a:fld id="{EA730EFB-AB28-4A68-9CF2-24FEA7CF3D98}" type="datetimeFigureOut">
               <a:rPr lang="en-US" smtClean="0"/>
-              <a:t>6/14/22</a:t>
+              <a:t>6/15/22</a:t>
             </a:fld>
             <a:endParaRPr lang="en-US"/>
           </a:p>
@@ -3989,7 +3997,7 @@
           <a:p>
             <a:fld id="{EA730EFB-AB28-4A68-9CF2-24FEA7CF3D98}" type="datetimeFigureOut">
               <a:rPr lang="en-US" smtClean="0"/>
-              <a:t>6/14/22</a:t>
+              <a:t>6/15/22</a:t>
             </a:fld>
             <a:endParaRPr lang="en-US"/>
           </a:p>
@@ -4201,7 +4209,7 @@
           <a:p>
             <a:fld id="{EA730EFB-AB28-4A68-9CF2-24FEA7CF3D98}" type="datetimeFigureOut">
               <a:rPr lang="en-US" smtClean="0"/>
-              <a:t>6/14/22</a:t>
+              <a:t>6/15/22</a:t>
             </a:fld>
             <a:endParaRPr lang="en-US"/>
           </a:p>
@@ -4451,7 +4459,7 @@
           <a:p>
             <a:fld id="{EA730EFB-AB28-4A68-9CF2-24FEA7CF3D98}" type="datetimeFigureOut">
               <a:rPr lang="en-US" smtClean="0"/>
-              <a:t>6/14/22</a:t>
+              <a:t>6/15/22</a:t>
             </a:fld>
             <a:endParaRPr lang="en-US"/>
           </a:p>
@@ -5181,12 +5189,32 @@
             <p:ph idx="1"/>
           </p:nvPr>
         </p:nvSpPr>
-        <p:spPr/>
+        <p:spPr>
+          <a:xfrm>
+            <a:off x="838200" y="1597152"/>
+            <a:ext cx="10515600" cy="4579811"/>
+          </a:xfrm>
+        </p:spPr>
         <p:txBody>
           <a:bodyPr vert="horz" lIns="91440" tIns="45720" rIns="91440" bIns="45720" rtlCol="0" anchor="t">
             <a:noAutofit/>
           </a:bodyPr>
           <a:lstStyle/>
+          <a:p>
+            <a:pPr marL="0" indent="0">
+              <a:buNone/>
+            </a:pPr>
+            <a:r>
+              <a:rPr lang="en-NL" dirty="0"/>
+              <a:t>Predict income and contract type in 2021 based on data from 2011.</a:t>
+            </a:r>
+          </a:p>
+          <a:p>
+            <a:pPr marL="0" indent="0">
+              <a:buNone/>
+            </a:pPr>
+            <a:endParaRPr lang="en-NL" dirty="0"/>
+          </a:p>
           <a:p>
             <a:pPr marL="0" indent="0">
               <a:buNone/>
@@ -5219,7 +5247,7 @@
             </a:r>
             <a:r>
               <a:rPr lang="en-GB" dirty="0"/>
-              <a:t>bruttoinc_imputed.21) given the data from 2011 </a:t>
+              <a:t>bruttoinc_imputed.21) </a:t>
             </a:r>
             <a:r>
               <a:rPr lang="en-NL" dirty="0">
@@ -5244,7 +5272,7 @@
               <a:rPr lang="en-NL" dirty="0">
                 <a:cs typeface="Assistant"/>
               </a:rPr>
-              <a:t> given the data from 2011 (classification problem)</a:t>
+              <a:t> (classification problem)</a:t>
             </a:r>
           </a:p>
           <a:p>
@@ -5256,9 +5284,38 @@
               <a:rPr lang="en-NL" dirty="0"/>
               <a:t>Solve the problem as best as you can!</a:t>
             </a:r>
+          </a:p>
+          <a:p>
+            <a:pPr marL="514350" indent="-514350">
+              <a:buFont typeface="+mj-lt"/>
+              <a:buAutoNum type="arabicPeriod"/>
+            </a:pPr>
             <a:endParaRPr lang="en-NL" dirty="0">
               <a:cs typeface="Assistant"/>
             </a:endParaRPr>
+          </a:p>
+          <a:p>
+            <a:pPr marL="0" indent="0">
+              <a:buNone/>
+            </a:pPr>
+            <a:r>
+              <a:rPr lang="en-NL" sz="2000" dirty="0">
+                <a:cs typeface="Assistant"/>
+              </a:rPr>
+              <a:t>(The features from 2011 end in </a:t>
+            </a:r>
+            <a:r>
+              <a:rPr lang="en-NL" sz="2000" i="1" dirty="0">
+                <a:cs typeface="Assistant"/>
+              </a:rPr>
+              <a:t>.11</a:t>
+            </a:r>
+            <a:r>
+              <a:rPr lang="en-NL" sz="2000" dirty="0">
+                <a:cs typeface="Assistant"/>
+              </a:rPr>
+              <a:t>. Do not include features ending in .21!)</a:t>
+            </a:r>
           </a:p>
         </p:txBody>
       </p:sp>
@@ -5338,8 +5395,8 @@
         </p:nvSpPr>
         <p:spPr>
           <a:xfrm>
-            <a:off x="838200" y="1825624"/>
-            <a:ext cx="7096950" cy="4519419"/>
+            <a:off x="597408" y="1487424"/>
+            <a:ext cx="7705344" cy="4857619"/>
           </a:xfrm>
         </p:spPr>
         <p:txBody>
@@ -5349,24 +5406,47 @@
           <a:lstStyle/>
           <a:p>
             <a:r>
-              <a:rPr lang="en-NL" sz="2400" dirty="0"/>
+              <a:rPr lang="en-NL" sz="2000" dirty="0"/>
               <a:t>Today:</a:t>
             </a:r>
-            <a:endParaRPr lang="en-US" sz="2400" dirty="0">
+            <a:endParaRPr lang="en-US" sz="2000" dirty="0">
               <a:cs typeface="Assistant"/>
             </a:endParaRPr>
           </a:p>
           <a:p>
             <a:pPr lvl="1"/>
             <a:r>
-              <a:rPr lang="en-NL" sz="2000" dirty="0"/>
+              <a:rPr lang="en-NL" sz="1800" dirty="0"/>
               <a:t>15:00-15:10 </a:t>
             </a:r>
+            <a:r>
+              <a:rPr lang="en-NL" sz="1800" dirty="0">
+                <a:sym typeface="Wingdings" pitchFamily="2" charset="2"/>
+              </a:rPr>
+              <a:t> Define the problem</a:t>
+            </a:r>
+            <a:endParaRPr lang="en-NL" sz="1800" dirty="0">
+              <a:cs typeface="Assistant"/>
+            </a:endParaRPr>
+          </a:p>
+          <a:p>
+            <a:pPr lvl="1"/>
+            <a:r>
+              <a:rPr lang="en-NL" sz="1800" dirty="0">
+                <a:sym typeface="Wingdings" pitchFamily="2" charset="2"/>
+              </a:rPr>
+              <a:t>15:10-16:00  Exploratory data analysis + prepare the data</a:t>
+            </a:r>
+            <a:endParaRPr lang="en-NL" sz="1800" dirty="0">
+              <a:cs typeface="Assistant"/>
+            </a:endParaRPr>
+          </a:p>
+          <a:p>
             <a:r>
               <a:rPr lang="en-NL" sz="2000" dirty="0">
                 <a:sym typeface="Wingdings" pitchFamily="2" charset="2"/>
               </a:rPr>
-              <a:t> Define the problem</a:t>
+              <a:t>Tomorrow:</a:t>
             </a:r>
             <a:endParaRPr lang="en-NL" sz="2000" dirty="0">
               <a:cs typeface="Assistant"/>
@@ -5375,60 +5455,81 @@
           <a:p>
             <a:pPr lvl="1"/>
             <a:r>
-              <a:rPr lang="en-NL" sz="2000" dirty="0">
-                <a:sym typeface="Wingdings" pitchFamily="2" charset="2"/>
-              </a:rPr>
-              <a:t>15:10-16:00  Exploratory data analysis + prepare the data</a:t>
-            </a:r>
-            <a:endParaRPr lang="en-NL" sz="2000" dirty="0">
-              <a:cs typeface="Assistant"/>
-            </a:endParaRPr>
-          </a:p>
-          <a:p>
-            <a:r>
-              <a:rPr lang="en-NL" sz="2400" dirty="0">
-                <a:sym typeface="Wingdings" pitchFamily="2" charset="2"/>
-              </a:rPr>
-              <a:t>Tomorrow:</a:t>
-            </a:r>
-            <a:endParaRPr lang="en-NL" sz="2400" dirty="0">
-              <a:cs typeface="Assistant"/>
-            </a:endParaRPr>
-          </a:p>
-          <a:p>
-            <a:pPr lvl="1"/>
-            <a:r>
-              <a:rPr lang="en-NL" sz="2000" dirty="0">
-                <a:sym typeface="Wingdings" pitchFamily="2" charset="2"/>
-              </a:rPr>
-              <a:t>12:30-14:20  Train and evaluate your first model</a:t>
-            </a:r>
-            <a:endParaRPr lang="en-NL" sz="2000" dirty="0">
-              <a:cs typeface="Assistant"/>
-            </a:endParaRPr>
-          </a:p>
-          <a:p>
-            <a:pPr lvl="1"/>
-            <a:r>
-              <a:rPr lang="en-NL" sz="2000" dirty="0">
-                <a:sym typeface="Wingdings" pitchFamily="2" charset="2"/>
-              </a:rPr>
-              <a:t>14:40:16:00  Iterate and try to improve your model</a:t>
-            </a:r>
-            <a:endParaRPr lang="en-NL" sz="2000" dirty="0">
-              <a:cs typeface="Assistant"/>
-            </a:endParaRPr>
-          </a:p>
-          <a:p>
-            <a:pPr marL="0" indent="0">
-              <a:buNone/>
-            </a:pPr>
-            <a:r>
               <a:rPr lang="en-NL" sz="1800" dirty="0">
                 <a:sym typeface="Wingdings" pitchFamily="2" charset="2"/>
               </a:rPr>
-              <a:t>Guidelines: </a:t>
-            </a:r>
+              <a:t>12:30-14:20  Train and evaluate your first model (income </a:t>
+            </a:r>
+            <a:r>
+              <a:rPr lang="en-NL" sz="1800" i="1" dirty="0">
+                <a:sym typeface="Wingdings" pitchFamily="2" charset="2"/>
+              </a:rPr>
+              <a:t>or</a:t>
+            </a:r>
+            <a:r>
+              <a:rPr lang="en-NL" sz="1800" dirty="0">
+                <a:sym typeface="Wingdings" pitchFamily="2" charset="2"/>
+              </a:rPr>
+              <a:t> contract type)</a:t>
+            </a:r>
+            <a:endParaRPr lang="en-NL" sz="1800" dirty="0">
+              <a:cs typeface="Assistant"/>
+            </a:endParaRPr>
+          </a:p>
+          <a:p>
+            <a:pPr lvl="1"/>
+            <a:r>
+              <a:rPr lang="en-NL" sz="1800" dirty="0">
+                <a:sym typeface="Wingdings" pitchFamily="2" charset="2"/>
+              </a:rPr>
+              <a:t>14:40:16:00  Iterate over the machine learning cycle! Try out different approaches to find the best one.</a:t>
+            </a:r>
+          </a:p>
+          <a:p>
+            <a:r>
+              <a:rPr lang="en-NL" sz="2000" dirty="0">
+                <a:cs typeface="Assistant"/>
+                <a:sym typeface="Wingdings" pitchFamily="2" charset="2"/>
+              </a:rPr>
+              <a:t>Friday:</a:t>
+            </a:r>
+          </a:p>
+          <a:p>
+            <a:pPr lvl="1"/>
+            <a:r>
+              <a:rPr lang="en-NL" sz="1800" dirty="0">
+                <a:cs typeface="Assistant"/>
+                <a:sym typeface="Wingdings" pitchFamily="2" charset="2"/>
+              </a:rPr>
+              <a:t>12:30-15:00  Train and evaluate both models (income </a:t>
+            </a:r>
+            <a:r>
+              <a:rPr lang="en-NL" sz="1800" i="1" dirty="0">
+                <a:cs typeface="Assistant"/>
+                <a:sym typeface="Wingdings" pitchFamily="2" charset="2"/>
+              </a:rPr>
+              <a:t>and</a:t>
+            </a:r>
+            <a:r>
+              <a:rPr lang="en-NL" sz="1800" dirty="0">
+                <a:cs typeface="Assistant"/>
+                <a:sym typeface="Wingdings" pitchFamily="2" charset="2"/>
+              </a:rPr>
+              <a:t> contract)</a:t>
+            </a:r>
+          </a:p>
+          <a:p>
+            <a:pPr lvl="1"/>
+            <a:r>
+              <a:rPr lang="en-NL" sz="1800" dirty="0">
+                <a:cs typeface="Assistant"/>
+                <a:sym typeface="Wingdings" pitchFamily="2" charset="2"/>
+              </a:rPr>
+              <a:t>15:00-16:00  Compare predictions</a:t>
+            </a:r>
+            <a:endParaRPr lang="en-NL" sz="1600" dirty="0">
+              <a:sym typeface="Wingdings" pitchFamily="2" charset="2"/>
+            </a:endParaRPr>
           </a:p>
           <a:p>
             <a:r>
@@ -5469,21 +5570,7 @@
                 <a:cs typeface="Assistant"/>
                 <a:sym typeface="Wingdings" pitchFamily="2" charset="2"/>
               </a:rPr>
-              <a:t>art </a:t>
-            </a:r>
-            <a:r>
-              <a:rPr lang="en-NL" sz="1400">
-                <a:cs typeface="Assistant"/>
-                <a:sym typeface="Wingdings" pitchFamily="2" charset="2"/>
-              </a:rPr>
-              <a:t>with approaches </a:t>
-            </a:r>
-            <a:r>
-              <a:rPr lang="en-NL" sz="1400" dirty="0">
-                <a:cs typeface="Assistant"/>
-                <a:sym typeface="Wingdings" pitchFamily="2" charset="2"/>
-              </a:rPr>
-              <a:t>you know</a:t>
+              <a:t>art with approaches you know</a:t>
             </a:r>
           </a:p>
           <a:p>
@@ -5547,7 +5634,7 @@
         </p:blipFill>
         <p:spPr bwMode="auto">
           <a:xfrm>
-            <a:off x="7935150" y="1678551"/>
+            <a:off x="8097382" y="1388619"/>
             <a:ext cx="4094618" cy="3500898"/>
           </a:xfrm>
           <a:prstGeom prst="rect">
@@ -6075,6 +6162,29 @@
 </file>
 
 <file path=customXml/item1.xml><?xml version="1.0" encoding="utf-8"?>
+<p:properties xmlns:p="http://schemas.microsoft.com/office/2006/metadata/properties" xmlns:xsi="http://www.w3.org/2001/XMLSchema-instance" xmlns:pc="http://schemas.microsoft.com/office/infopath/2007/PartnerControls">
+  <documentManagement>
+    <lcf76f155ced4ddcb4097134ff3c332f xmlns="af34c8a9-9806-44d6-aa44-d772f2793323">
+      <Terms xmlns="http://schemas.microsoft.com/office/infopath/2007/PartnerControls"/>
+    </lcf76f155ced4ddcb4097134ff3c332f>
+    <TaxCatchAll xmlns="26898810-f9b9-406f-8188-8f8f7cdf5520" xsi:nil="true"/>
+    <SharedWithUsers xmlns="26898810-f9b9-406f-8188-8f8f7cdf5520">
+      <UserInfo>
+        <DisplayName>Meijer, E. (PHEG)</DisplayName>
+        <AccountId>58</AccountId>
+        <AccountType/>
+      </UserInfo>
+      <UserInfo>
+        <DisplayName>Sven van der Burg</DisplayName>
+        <AccountId>24</AccountId>
+        <AccountType/>
+      </UserInfo>
+    </SharedWithUsers>
+  </documentManagement>
+</p:properties>
+</file>
+
+<file path=customXml/item2.xml><?xml version="1.0" encoding="utf-8"?>
 <?mso-contentType ?>
 <FormTemplates xmlns="http://schemas.microsoft.com/sharepoint/v3/contenttype/forms">
   <Display>DocumentLibraryForm</Display>
@@ -6083,7 +6193,7 @@
 </FormTemplates>
 </file>
 
-<file path=customXml/item2.xml><?xml version="1.0" encoding="utf-8"?>
+<file path=customXml/item3.xml><?xml version="1.0" encoding="utf-8"?>
 <ct:contentTypeSchema xmlns:ct="http://schemas.microsoft.com/office/2006/metadata/contentType" xmlns:ma="http://schemas.microsoft.com/office/2006/metadata/properties/metaAttributes" ct:_="" ma:_="" ma:contentTypeName="Document" ma:contentTypeID="0x01010097164C23EC47024F97AA423E75479F12" ma:contentTypeVersion="16" ma:contentTypeDescription="Create a new document." ma:contentTypeScope="" ma:versionID="a3556cdf3cb0a10d0be023fe9715bf40">
   <xsd:schema xmlns:xsd="http://www.w3.org/2001/XMLSchema" xmlns:xs="http://www.w3.org/2001/XMLSchema" xmlns:p="http://schemas.microsoft.com/office/2006/metadata/properties" xmlns:ns2="af34c8a9-9806-44d6-aa44-d772f2793323" xmlns:ns3="26898810-f9b9-406f-8188-8f8f7cdf5520" targetNamespace="http://schemas.microsoft.com/office/2006/metadata/properties" ma:root="true" ma:fieldsID="e60ec4d90372c9dd7f865339ba7db329" ns2:_="" ns3:_="">
     <xsd:import namespace="af34c8a9-9806-44d6-aa44-d772f2793323"/>
@@ -6320,30 +6430,24 @@
 </ct:contentTypeSchema>
 </file>
 
-<file path=customXml/item3.xml><?xml version="1.0" encoding="utf-8"?>
-<p:properties xmlns:p="http://schemas.microsoft.com/office/2006/metadata/properties" xmlns:xsi="http://www.w3.org/2001/XMLSchema-instance" xmlns:pc="http://schemas.microsoft.com/office/infopath/2007/PartnerControls">
-  <documentManagement>
-    <lcf76f155ced4ddcb4097134ff3c332f xmlns="af34c8a9-9806-44d6-aa44-d772f2793323">
-      <Terms xmlns="http://schemas.microsoft.com/office/infopath/2007/PartnerControls"/>
-    </lcf76f155ced4ddcb4097134ff3c332f>
-    <TaxCatchAll xmlns="26898810-f9b9-406f-8188-8f8f7cdf5520" xsi:nil="true"/>
-    <SharedWithUsers xmlns="26898810-f9b9-406f-8188-8f8f7cdf5520">
-      <UserInfo>
-        <DisplayName>Meijer, E. (PHEG)</DisplayName>
-        <AccountId>58</AccountId>
-        <AccountType/>
-      </UserInfo>
-      <UserInfo>
-        <DisplayName>Sven van der Burg</DisplayName>
-        <AccountId>24</AccountId>
-        <AccountType/>
-      </UserInfo>
-    </SharedWithUsers>
-  </documentManagement>
-</p:properties>
+<file path=customXml/itemProps1.xml><?xml version="1.0" encoding="utf-8"?>
+<ds:datastoreItem xmlns:ds="http://schemas.openxmlformats.org/officeDocument/2006/customXml" ds:itemID="{70FF6FBF-B4F4-49AD-A88B-091F94ABFAFA}">
+  <ds:schemaRefs>
+    <ds:schemaRef ds:uri="http://schemas.microsoft.com/office/2006/metadata/properties"/>
+    <ds:schemaRef ds:uri="http://purl.org/dc/elements/1.1/"/>
+    <ds:schemaRef ds:uri="26898810-f9b9-406f-8188-8f8f7cdf5520"/>
+    <ds:schemaRef ds:uri="http://schemas.microsoft.com/office/infopath/2007/PartnerControls"/>
+    <ds:schemaRef ds:uri="http://schemas.openxmlformats.org/package/2006/metadata/core-properties"/>
+    <ds:schemaRef ds:uri="http://purl.org/dc/dcmitype/"/>
+    <ds:schemaRef ds:uri="http://schemas.microsoft.com/office/2006/documentManagement/types"/>
+    <ds:schemaRef ds:uri="af34c8a9-9806-44d6-aa44-d772f2793323"/>
+    <ds:schemaRef ds:uri="http://www.w3.org/XML/1998/namespace"/>
+    <ds:schemaRef ds:uri="http://purl.org/dc/terms/"/>
+  </ds:schemaRefs>
+</ds:datastoreItem>
 </file>
 
-<file path=customXml/itemProps1.xml><?xml version="1.0" encoding="utf-8"?>
+<file path=customXml/itemProps2.xml><?xml version="1.0" encoding="utf-8"?>
 <ds:datastoreItem xmlns:ds="http://schemas.openxmlformats.org/officeDocument/2006/customXml" ds:itemID="{B72CECC3-7DC2-48A3-A34C-CF77ADEDD298}">
   <ds:schemaRefs>
     <ds:schemaRef ds:uri="http://schemas.microsoft.com/sharepoint/v3/contenttype/forms"/>
@@ -6351,7 +6455,7 @@
 </ds:datastoreItem>
 </file>
 
-<file path=customXml/itemProps2.xml><?xml version="1.0" encoding="utf-8"?>
+<file path=customXml/itemProps3.xml><?xml version="1.0" encoding="utf-8"?>
 <ds:datastoreItem xmlns:ds="http://schemas.openxmlformats.org/officeDocument/2006/customXml" ds:itemID="{FE60F047-FD66-419C-9B3C-A586DA10541A}">
   <ds:schemaRefs>
     <ds:schemaRef ds:uri="26898810-f9b9-406f-8188-8f8f7cdf5520"/>
@@ -6368,21 +6472,4 @@
     <ds:schemaRef ds:uri="http://www.w3.org/2001/XMLSchema"/>
   </ds:schemaRefs>
 </ds:datastoreItem>
-</file>
-
-<file path=customXml/itemProps3.xml><?xml version="1.0" encoding="utf-8"?>
-<ds:datastoreItem xmlns:ds="http://schemas.openxmlformats.org/officeDocument/2006/customXml" ds:itemID="{70FF6FBF-B4F4-49AD-A88B-091F94ABFAFA}">
-  <ds:schemaRefs>
-    <ds:schemaRef ds:uri="26898810-f9b9-406f-8188-8f8f7cdf5520"/>
-    <ds:schemaRef ds:uri="af34c8a9-9806-44d6-aa44-d772f2793323"/>
-    <ds:schemaRef ds:uri="http://purl.org/dc/dcmitype/"/>
-    <ds:schemaRef ds:uri="http://purl.org/dc/elements/1.1/"/>
-    <ds:schemaRef ds:uri="http://purl.org/dc/terms/"/>
-    <ds:schemaRef ds:uri="http://schemas.microsoft.com/office/2006/documentManagement/types"/>
-    <ds:schemaRef ds:uri="http://schemas.microsoft.com/office/2006/metadata/properties"/>
-    <ds:schemaRef ds:uri="http://schemas.microsoft.com/office/infopath/2007/PartnerControls"/>
-    <ds:schemaRef ds:uri="http://schemas.openxmlformats.org/package/2006/metadata/core-properties"/>
-    <ds:schemaRef ds:uri="http://www.w3.org/XML/1998/namespace"/>
-  </ds:schemaRefs>
-</ds:datastoreItem>
 </file>
</xml_diff>